<commit_message>
added the org.thilanka.androidthings.aix file
</commit_message>
<xml_diff>
--- a/gsoc17/tutorial/Android_Things_GPIO_Input/movie_presentation.pptx
+++ b/gsoc17/tutorial/Android_Things_GPIO_Input/movie_presentation.pptx
@@ -118,6 +118,22 @@
       </a:defRPr>
     </a:lvl9pPr>
   </p:defaultTextStyle>
+  <p:extLst>
+    <p:ext uri="{EFAFB233-063F-42B5-8137-9DF3F51BA10A}">
+      <p15:sldGuideLst xmlns:p15="http://schemas.microsoft.com/office/powerpoint/2012/main">
+        <p15:guide id="1" orient="horz" pos="2160">
+          <p15:clr>
+            <a:srgbClr val="A4A3A4"/>
+          </p15:clr>
+        </p15:guide>
+        <p15:guide id="2" pos="2880">
+          <p15:clr>
+            <a:srgbClr val="A4A3A4"/>
+          </p15:clr>
+        </p15:guide>
+      </p15:sldGuideLst>
+    </p:ext>
+  </p:extLst>
 </p:presentation>
 </file>
 
@@ -302,7 +318,7 @@
           <a:p>
             <a:fld id="{6BFECD78-3C8E-49F2-8FAB-59489D168ABB}" type="datetimeFigureOut">
               <a:rPr lang="en-US" smtClean="0"/>
-              <a:t>8/26/17</a:t>
+              <a:t>8/27/17</a:t>
             </a:fld>
             <a:endParaRPr lang="en-US"/>
           </a:p>
@@ -472,7 +488,7 @@
           <a:p>
             <a:fld id="{6BFECD78-3C8E-49F2-8FAB-59489D168ABB}" type="datetimeFigureOut">
               <a:rPr lang="en-US" smtClean="0"/>
-              <a:t>8/26/17</a:t>
+              <a:t>8/27/17</a:t>
             </a:fld>
             <a:endParaRPr lang="en-US"/>
           </a:p>
@@ -652,7 +668,7 @@
           <a:p>
             <a:fld id="{6BFECD78-3C8E-49F2-8FAB-59489D168ABB}" type="datetimeFigureOut">
               <a:rPr lang="en-US" smtClean="0"/>
-              <a:t>8/26/17</a:t>
+              <a:t>8/27/17</a:t>
             </a:fld>
             <a:endParaRPr lang="en-US"/>
           </a:p>
@@ -822,7 +838,7 @@
           <a:p>
             <a:fld id="{6BFECD78-3C8E-49F2-8FAB-59489D168ABB}" type="datetimeFigureOut">
               <a:rPr lang="en-US" smtClean="0"/>
-              <a:t>8/26/17</a:t>
+              <a:t>8/27/17</a:t>
             </a:fld>
             <a:endParaRPr lang="en-US"/>
           </a:p>
@@ -1068,7 +1084,7 @@
           <a:p>
             <a:fld id="{6BFECD78-3C8E-49F2-8FAB-59489D168ABB}" type="datetimeFigureOut">
               <a:rPr lang="en-US" smtClean="0"/>
-              <a:t>8/26/17</a:t>
+              <a:t>8/27/17</a:t>
             </a:fld>
             <a:endParaRPr lang="en-US"/>
           </a:p>
@@ -1356,7 +1372,7 @@
           <a:p>
             <a:fld id="{6BFECD78-3C8E-49F2-8FAB-59489D168ABB}" type="datetimeFigureOut">
               <a:rPr lang="en-US" smtClean="0"/>
-              <a:t>8/26/17</a:t>
+              <a:t>8/27/17</a:t>
             </a:fld>
             <a:endParaRPr lang="en-US"/>
           </a:p>
@@ -1778,7 +1794,7 @@
           <a:p>
             <a:fld id="{6BFECD78-3C8E-49F2-8FAB-59489D168ABB}" type="datetimeFigureOut">
               <a:rPr lang="en-US" smtClean="0"/>
-              <a:t>8/26/17</a:t>
+              <a:t>8/27/17</a:t>
             </a:fld>
             <a:endParaRPr lang="en-US"/>
           </a:p>
@@ -1896,7 +1912,7 @@
           <a:p>
             <a:fld id="{6BFECD78-3C8E-49F2-8FAB-59489D168ABB}" type="datetimeFigureOut">
               <a:rPr lang="en-US" smtClean="0"/>
-              <a:t>8/26/17</a:t>
+              <a:t>8/27/17</a:t>
             </a:fld>
             <a:endParaRPr lang="en-US"/>
           </a:p>
@@ -1991,7 +2007,7 @@
           <a:p>
             <a:fld id="{6BFECD78-3C8E-49F2-8FAB-59489D168ABB}" type="datetimeFigureOut">
               <a:rPr lang="en-US" smtClean="0"/>
-              <a:t>8/26/17</a:t>
+              <a:t>8/27/17</a:t>
             </a:fld>
             <a:endParaRPr lang="en-US"/>
           </a:p>
@@ -2268,7 +2284,7 @@
           <a:p>
             <a:fld id="{6BFECD78-3C8E-49F2-8FAB-59489D168ABB}" type="datetimeFigureOut">
               <a:rPr lang="en-US" smtClean="0"/>
-              <a:t>8/26/17</a:t>
+              <a:t>8/27/17</a:t>
             </a:fld>
             <a:endParaRPr lang="en-US"/>
           </a:p>
@@ -2525,7 +2541,7 @@
           <a:p>
             <a:fld id="{6BFECD78-3C8E-49F2-8FAB-59489D168ABB}" type="datetimeFigureOut">
               <a:rPr lang="en-US" smtClean="0"/>
-              <a:t>8/26/17</a:t>
+              <a:t>8/27/17</a:t>
             </a:fld>
             <a:endParaRPr lang="en-US"/>
           </a:p>
@@ -2738,7 +2754,7 @@
           <a:p>
             <a:fld id="{6BFECD78-3C8E-49F2-8FAB-59489D168ABB}" type="datetimeFigureOut">
               <a:rPr lang="en-US" smtClean="0"/>
-              <a:t>8/26/17</a:t>
+              <a:t>8/27/17</a:t>
             </a:fld>
             <a:endParaRPr lang="en-US"/>
           </a:p>
@@ -3183,7 +3199,6 @@
               <a:rPr lang="en-US" dirty="0" smtClean="0"/>
               <a:t>1 LED</a:t>
             </a:r>
-            <a:endParaRPr lang="en-US" dirty="0" smtClean="0"/>
           </a:p>
           <a:p>
             <a:r>
@@ -3194,7 +3209,6 @@
               <a:rPr lang="en-US" dirty="0" smtClean="0"/>
               <a:t> Resistors</a:t>
             </a:r>
-            <a:endParaRPr lang="en-US" dirty="0" smtClean="0"/>
           </a:p>
           <a:p>
             <a:r>
@@ -3223,7 +3237,7 @@
   <p:timing>
     <p:tnLst>
       <p:par>
-        <p:cTn xmlns:p14="http://schemas.microsoft.com/office/powerpoint/2010/main" id="1" dur="indefinite" restart="never" nodeType="tmRoot"/>
+        <p:cTn id="1" dur="indefinite" restart="never" nodeType="tmRoot"/>
       </p:par>
     </p:tnLst>
   </p:timing>
@@ -3302,7 +3316,7 @@
   <p:timing>
     <p:tnLst>
       <p:par>
-        <p:cTn xmlns:p14="http://schemas.microsoft.com/office/powerpoint/2010/main" id="1" dur="indefinite" restart="never" nodeType="tmRoot"/>
+        <p:cTn id="1" dur="indefinite" restart="never" nodeType="tmRoot"/>
       </p:par>
     </p:tnLst>
   </p:timing>
@@ -3440,7 +3454,7 @@
   <p:timing>
     <p:tnLst>
       <p:par>
-        <p:cTn xmlns:p14="http://schemas.microsoft.com/office/powerpoint/2010/main" id="1" dur="indefinite" restart="never" nodeType="tmRoot"/>
+        <p:cTn id="1" dur="indefinite" restart="never" nodeType="tmRoot"/>
       </p:par>
     </p:tnLst>
   </p:timing>
@@ -3548,31 +3562,7 @@
             </a:r>
             <a:r>
               <a:rPr lang="en-US" dirty="0" smtClean="0"/>
-              <a:t>” : the directionality of the pin, i.e. </a:t>
-            </a:r>
-            <a:r>
-              <a:rPr lang="en-US" dirty="0" smtClean="0"/>
-              <a:t>false indicates </a:t>
-            </a:r>
-            <a:r>
-              <a:rPr lang="en-US" dirty="0" smtClean="0"/>
-              <a:t>an </a:t>
-            </a:r>
-            <a:r>
-              <a:rPr lang="en-US" dirty="0" smtClean="0"/>
-              <a:t>input device </a:t>
-            </a:r>
-            <a:r>
-              <a:rPr lang="en-US" dirty="0" smtClean="0"/>
-              <a:t>such as </a:t>
-            </a:r>
-            <a:r>
-              <a:rPr lang="en-US" dirty="0" smtClean="0"/>
-              <a:t>the push button that </a:t>
-            </a:r>
-            <a:r>
-              <a:rPr lang="en-US" dirty="0" smtClean="0"/>
-              <a:t>is attached.</a:t>
+              <a:t>” : the directionality of the pin, i.e. false indicates an input device such as the push button that is attached.</a:t>
             </a:r>
           </a:p>
           <a:p>
@@ -3606,7 +3596,7 @@
   <p:timing>
     <p:tnLst>
       <p:par>
-        <p:cTn xmlns:p14="http://schemas.microsoft.com/office/powerpoint/2010/main" id="1" dur="indefinite" restart="never" nodeType="tmRoot"/>
+        <p:cTn id="1" dur="indefinite" restart="never" nodeType="tmRoot"/>
       </p:par>
     </p:tnLst>
   </p:timing>
@@ -3704,7 +3694,7 @@
   <p:timing>
     <p:tnLst>
       <p:par>
-        <p:cTn xmlns:p14="http://schemas.microsoft.com/office/powerpoint/2010/main" id="1" dur="indefinite" restart="never" nodeType="tmRoot"/>
+        <p:cTn id="1" dur="indefinite" restart="never" nodeType="tmRoot"/>
       </p:par>
     </p:tnLst>
   </p:timing>
@@ -3783,7 +3773,7 @@
   <p:timing>
     <p:tnLst>
       <p:par>
-        <p:cTn xmlns:p14="http://schemas.microsoft.com/office/powerpoint/2010/main" id="1" dur="indefinite" restart="never" nodeType="tmRoot"/>
+        <p:cTn id="1" dur="indefinite" restart="never" nodeType="tmRoot"/>
       </p:par>
     </p:tnLst>
   </p:timing>
@@ -3862,7 +3852,7 @@
   <p:timing>
     <p:tnLst>
       <p:par>
-        <p:cTn xmlns:p14="http://schemas.microsoft.com/office/powerpoint/2010/main" id="1" dur="indefinite" restart="never" nodeType="tmRoot"/>
+        <p:cTn id="1" dur="indefinite" restart="never" nodeType="tmRoot"/>
       </p:par>
     </p:tnLst>
   </p:timing>
@@ -3941,7 +3931,7 @@
   <p:timing>
     <p:tnLst>
       <p:par>
-        <p:cTn xmlns:p14="http://schemas.microsoft.com/office/powerpoint/2010/main" id="1" dur="indefinite" restart="never" nodeType="tmRoot"/>
+        <p:cTn id="1" dur="indefinite" restart="never" nodeType="tmRoot"/>
       </p:par>
     </p:tnLst>
   </p:timing>
@@ -4093,14 +4083,10 @@
             </a:r>
             <a:r>
               <a:rPr lang="en-US" sz="2000" dirty="0"/>
-              <a:t>Pi 3 Flash </a:t>
-            </a:r>
-            <a:r>
-              <a:rPr lang="en-US" sz="2000"/>
-              <a:t>Image </a:t>
-            </a:r>
-            <a:r>
-              <a:rPr lang="en-US" sz="2000" smtClean="0"/>
+              <a:t>Pi 3 Flash Image </a:t>
+            </a:r>
+            <a:r>
+              <a:rPr lang="en-US" sz="2000" dirty="0" smtClean="0"/>
               <a:t>from: </a:t>
             </a:r>
             <a:r>
@@ -4126,7 +4112,7 @@
   <p:timing>
     <p:tnLst>
       <p:par>
-        <p:cTn xmlns:p14="http://schemas.microsoft.com/office/powerpoint/2010/main" id="1" dur="indefinite" restart="never" nodeType="tmRoot"/>
+        <p:cTn id="1" dur="indefinite" restart="never" nodeType="tmRoot"/>
       </p:par>
     </p:tnLst>
   </p:timing>
@@ -4174,11 +4160,7 @@
           <a:p>
             <a:r>
               <a:rPr lang="en-US" dirty="0" smtClean="0"/>
-              <a:t>Prepare your Android Things Board </a:t>
-            </a:r>
-            <a:r>
-              <a:rPr lang="en-US" dirty="0" smtClean="0"/>
-              <a:t>(2)</a:t>
+              <a:t>Prepare your Android Things Board (2)</a:t>
             </a:r>
             <a:endParaRPr lang="en-US" dirty="0"/>
           </a:p>
@@ -4248,7 +4230,7 @@
   <p:timing>
     <p:tnLst>
       <p:par>
-        <p:cTn xmlns:p14="http://schemas.microsoft.com/office/powerpoint/2010/main" id="1" dur="indefinite" restart="never" nodeType="tmRoot"/>
+        <p:cTn id="1" dur="indefinite" restart="never" nodeType="tmRoot"/>
       </p:par>
     </p:tnLst>
   </p:timing>
@@ -4291,11 +4273,7 @@
           <a:p>
             <a:r>
               <a:rPr lang="en-US" dirty="0" smtClean="0"/>
-              <a:t>Prepare your Android Things Board </a:t>
-            </a:r>
-            <a:r>
-              <a:rPr lang="en-US" dirty="0" smtClean="0"/>
-              <a:t>(3)</a:t>
+              <a:t>Prepare your Android Things Board (3)</a:t>
             </a:r>
             <a:endParaRPr lang="en-US" dirty="0"/>
           </a:p>
@@ -4433,7 +4411,7 @@
   <p:timing>
     <p:tnLst>
       <p:par>
-        <p:cTn xmlns:p14="http://schemas.microsoft.com/office/powerpoint/2010/main" id="1" dur="indefinite" restart="never" nodeType="tmRoot"/>
+        <p:cTn id="1" dur="indefinite" restart="never" nodeType="tmRoot"/>
       </p:par>
     </p:tnLst>
   </p:timing>
@@ -4514,7 +4492,7 @@
   <p:timing>
     <p:tnLst>
       <p:par>
-        <p:cTn xmlns:p14="http://schemas.microsoft.com/office/powerpoint/2010/main" id="1" dur="indefinite" restart="never" nodeType="tmRoot"/>
+        <p:cTn id="1" dur="indefinite" restart="never" nodeType="tmRoot"/>
       </p:par>
     </p:tnLst>
   </p:timing>
@@ -4557,15 +4535,7 @@
           <a:p>
             <a:r>
               <a:rPr lang="en-US" dirty="0" smtClean="0"/>
-              <a:t>You should see something similar to the following on </a:t>
-            </a:r>
-            <a:r>
-              <a:rPr lang="en-US" dirty="0" smtClean="0"/>
-              <a:t>your </a:t>
-            </a:r>
-            <a:r>
-              <a:rPr lang="en-US" dirty="0" smtClean="0"/>
-              <a:t>console.</a:t>
+              <a:t>You should see something similar to the following on your console.</a:t>
             </a:r>
             <a:endParaRPr lang="en-US" dirty="0"/>
           </a:p>
@@ -4607,7 +4577,7 @@
   <p:timing>
     <p:tnLst>
       <p:par>
-        <p:cTn xmlns:p14="http://schemas.microsoft.com/office/powerpoint/2010/main" id="1" dur="indefinite" restart="never" nodeType="tmRoot"/>
+        <p:cTn id="1" dur="indefinite" restart="never" nodeType="tmRoot"/>
       </p:par>
     </p:tnLst>
   </p:timing>
@@ -4644,7 +4614,7 @@
         <p:spPr/>
         <p:txBody>
           <a:bodyPr>
-            <a:normAutofit fontScale="90000"/>
+            <a:normAutofit/>
           </a:bodyPr>
           <a:lstStyle/>
           <a:p>
@@ -4721,7 +4691,7 @@
   <p:timing>
     <p:tnLst>
       <p:par>
-        <p:cTn xmlns:p14="http://schemas.microsoft.com/office/powerpoint/2010/main" id="1" dur="indefinite" restart="never" nodeType="tmRoot"/>
+        <p:cTn id="1" dur="indefinite" restart="never" nodeType="tmRoot"/>
       </p:par>
     </p:tnLst>
   </p:timing>
@@ -4764,11 +4734,7 @@
           <a:p>
             <a:r>
               <a:rPr lang="en-US" dirty="0" smtClean="0"/>
-              <a:t>Create </a:t>
-            </a:r>
-            <a:r>
-              <a:rPr lang="en-US" dirty="0" smtClean="0"/>
-              <a:t>an App Inventor project</a:t>
+              <a:t>Create an App Inventor project</a:t>
             </a:r>
             <a:endParaRPr lang="en-US" dirty="0"/>
           </a:p>
@@ -4798,7 +4764,11 @@
           <a:p>
             <a:r>
               <a:rPr lang="en-US" dirty="0" smtClean="0"/>
-              <a:t>“Register” button: </a:t>
+              <a:t>“Register</a:t>
+            </a:r>
+            <a:r>
+              <a:rPr lang="en-US" dirty="0" smtClean="0"/>
+              <a:t>” button: </a:t>
             </a:r>
           </a:p>
           <a:p>
@@ -4832,32 +4802,24 @@
           <a:p>
             <a:r>
               <a:rPr lang="en-US" dirty="0" err="1" smtClean="0"/>
-              <a:t>AndroidThings</a:t>
-            </a:r>
+              <a:t>AndroidThingsBoard</a:t>
+            </a:r>
+            <a:r>
+              <a:rPr lang="en-US" dirty="0" smtClean="0"/>
+              <a:t>:</a:t>
+            </a:r>
+          </a:p>
+          <a:p>
+            <a:pPr lvl="1"/>
+            <a:r>
+              <a:rPr lang="en-US" dirty="0" smtClean="0"/>
+              <a:t>Component that models an Android Things Board.</a:t>
+            </a:r>
+          </a:p>
+          <a:p>
             <a:r>
               <a:rPr lang="en-US" dirty="0" err="1" smtClean="0"/>
-              <a:t>Board</a:t>
-            </a:r>
-            <a:r>
-              <a:rPr lang="en-US" dirty="0" smtClean="0"/>
-              <a:t>:</a:t>
-            </a:r>
-          </a:p>
-          <a:p>
-            <a:pPr lvl="1"/>
-            <a:r>
-              <a:rPr lang="en-US" dirty="0" smtClean="0"/>
-              <a:t>Component that models an Android Things Board.</a:t>
-            </a:r>
-          </a:p>
-          <a:p>
-            <a:r>
-              <a:rPr lang="en-US" dirty="0" err="1" smtClean="0"/>
-              <a:t>AndroidThings</a:t>
-            </a:r>
-            <a:r>
-              <a:rPr lang="en-US" dirty="0" err="1" smtClean="0"/>
-              <a:t>GPIO</a:t>
+              <a:t>AndroidThingsGPIO</a:t>
             </a:r>
             <a:r>
               <a:rPr lang="en-US" dirty="0" smtClean="0"/>
@@ -4887,7 +4849,7 @@
   <p:timing>
     <p:tnLst>
       <p:par>
-        <p:cTn xmlns:p14="http://schemas.microsoft.com/office/powerpoint/2010/main" id="1" dur="indefinite" restart="never" nodeType="tmRoot"/>
+        <p:cTn id="1" dur="indefinite" restart="never" nodeType="tmRoot"/>
       </p:par>
     </p:tnLst>
   </p:timing>

</xml_diff>